<commit_message>
Updates to Ohio DevFest version of AWS Java Lambda Functions with Kotlin
</commit_message>
<xml_diff>
--- a/AWS Java Lambda Functions with Kotlin Ohio DevFest 2018.pptx
+++ b/AWS Java Lambda Functions with Kotlin Ohio DevFest 2018.pptx
@@ -15,7 +15,7 @@
     <p:sldId id="257" r:id="rId3"/>
     <p:sldId id="266" r:id="rId4"/>
     <p:sldId id="258" r:id="rId5"/>
-    <p:sldId id="259" r:id="rId6"/>
+    <p:sldId id="275" r:id="rId6"/>
     <p:sldId id="272" r:id="rId7"/>
     <p:sldId id="261" r:id="rId8"/>
     <p:sldId id="262" r:id="rId9"/>
@@ -226,7 +226,7 @@
           <a:p>
             <a:fld id="{B398E617-937E-FC4A-8748-C6BABACC53FE}" type="datetimeFigureOut">
               <a:rPr lang="en-US" smtClean="0"/>
-              <a:t>10/1/18</a:t>
+              <a:t>10/8/18</a:t>
             </a:fld>
             <a:endParaRPr lang="en-US"/>
           </a:p>
@@ -391,7 +391,7 @@
           <a:p>
             <a:fld id="{1DC1E76F-63EC-3849-B890-E56FE4AABDB1}" type="datetimeFigureOut">
               <a:rPr lang="en-US" smtClean="0"/>
-              <a:t>10/1/18</a:t>
+              <a:t>10/8/18</a:t>
             </a:fld>
             <a:endParaRPr lang="en-US"/>
           </a:p>
@@ -1090,7 +1090,7 @@
           <a:p>
             <a:fld id="{A0DB8B27-213D-1845-BA35-6CDA5CBC5B02}" type="datetime1">
               <a:rPr lang="en-US" smtClean="0"/>
-              <a:t>10/1/18</a:t>
+              <a:t>10/8/18</a:t>
             </a:fld>
             <a:endParaRPr lang="en-US"/>
           </a:p>
@@ -1291,7 +1291,7 @@
           <a:p>
             <a:fld id="{B0AB6128-0D2A-1245-9422-C3BE68F27997}" type="datetime1">
               <a:rPr lang="en-US" smtClean="0"/>
-              <a:t>10/1/18</a:t>
+              <a:t>10/8/18</a:t>
             </a:fld>
             <a:endParaRPr lang="en-US"/>
           </a:p>
@@ -1504,7 +1504,7 @@
           <a:p>
             <a:fld id="{5DDAD2AB-239F-2F48-8CAB-B916A8C6725B}" type="datetime1">
               <a:rPr lang="en-US" smtClean="0"/>
-              <a:t>10/1/18</a:t>
+              <a:t>10/8/18</a:t>
             </a:fld>
             <a:endParaRPr lang="en-US"/>
           </a:p>
@@ -1793,7 +1793,7 @@
           <a:p>
             <a:fld id="{AE59933F-E581-284D-9F44-23CAF5A7BE8E}" type="datetime1">
               <a:rPr lang="en-US" smtClean="0"/>
-              <a:t>10/1/18</a:t>
+              <a:t>10/8/18</a:t>
             </a:fld>
             <a:endParaRPr lang="en-US"/>
           </a:p>
@@ -2166,7 +2166,7 @@
           <a:p>
             <a:fld id="{0649FB6B-7974-BC47-8B12-FCA27EBCD9A0}" type="datetime1">
               <a:rPr lang="en-US" smtClean="0"/>
-              <a:t>10/1/18</a:t>
+              <a:t>10/8/18</a:t>
             </a:fld>
             <a:endParaRPr lang="en-US"/>
           </a:p>
@@ -2389,7 +2389,7 @@
           <a:p>
             <a:fld id="{4BE75957-40B6-744E-99B6-AB95327FBD2E}" type="datetime1">
               <a:rPr lang="en-US" smtClean="0"/>
-              <a:t>10/1/18</a:t>
+              <a:t>10/8/18</a:t>
             </a:fld>
             <a:endParaRPr lang="en-US"/>
           </a:p>
@@ -2669,7 +2669,7 @@
           <a:p>
             <a:fld id="{3E39426D-E7B7-DA40-93F8-CA6510E6F0EE}" type="datetime1">
               <a:rPr lang="en-US" smtClean="0"/>
-              <a:t>10/1/18</a:t>
+              <a:t>10/8/18</a:t>
             </a:fld>
             <a:endParaRPr lang="en-US"/>
           </a:p>
@@ -2939,7 +2939,7 @@
           <a:p>
             <a:fld id="{6B8E9881-841B-FD47-8067-4CE54162D2D7}" type="datetime1">
               <a:rPr lang="en-US" smtClean="0"/>
-              <a:t>10/1/18</a:t>
+              <a:t>10/8/18</a:t>
             </a:fld>
             <a:endParaRPr lang="en-US"/>
           </a:p>
@@ -3356,7 +3356,7 @@
           <a:p>
             <a:fld id="{70DA7BF9-37F6-DD44-9E60-798365980305}" type="datetime1">
               <a:rPr lang="en-US" smtClean="0"/>
-              <a:t>10/1/18</a:t>
+              <a:t>10/8/18</a:t>
             </a:fld>
             <a:endParaRPr lang="en-US"/>
           </a:p>
@@ -3502,7 +3502,7 @@
           <a:p>
             <a:fld id="{694812C7-2D69-FD44-8352-9031E5BB8854}" type="datetime1">
               <a:rPr lang="en-US" smtClean="0"/>
-              <a:t>10/1/18</a:t>
+              <a:t>10/8/18</a:t>
             </a:fld>
             <a:endParaRPr lang="en-US"/>
           </a:p>
@@ -3620,7 +3620,7 @@
           <a:p>
             <a:fld id="{D6DC22B3-CCBA-7E4B-9576-3F4BAADBA1E6}" type="datetime1">
               <a:rPr lang="en-US" smtClean="0"/>
-              <a:t>10/1/18</a:t>
+              <a:t>10/8/18</a:t>
             </a:fld>
             <a:endParaRPr lang="en-US"/>
           </a:p>
@@ -3936,7 +3936,7 @@
           <a:p>
             <a:fld id="{EADB070B-3D41-AA46-9B8A-CB2ED9C06DB1}" type="datetime1">
               <a:rPr lang="en-US" smtClean="0"/>
-              <a:t>10/1/18</a:t>
+              <a:t>10/8/18</a:t>
             </a:fld>
             <a:endParaRPr lang="en-US" dirty="0"/>
           </a:p>
@@ -4228,7 +4228,7 @@
           <a:p>
             <a:fld id="{1EE23566-357D-9145-AFF5-B5286448FCC5}" type="datetime1">
               <a:rPr lang="en-US" smtClean="0"/>
-              <a:t>10/1/18</a:t>
+              <a:t>10/8/18</a:t>
             </a:fld>
             <a:endParaRPr lang="en-US"/>
           </a:p>
@@ -4478,7 +4478,7 @@
           <a:p>
             <a:fld id="{DD03A468-7FFD-8642-805A-7250196496B4}" type="datetime1">
               <a:rPr lang="en-US" smtClean="0"/>
-              <a:t>10/1/18</a:t>
+              <a:t>10/8/18</a:t>
             </a:fld>
             <a:endParaRPr lang="en-US"/>
           </a:p>
@@ -5128,7 +5128,7 @@
           <a:p>
             <a:fld id="{5ECE730C-6F03-F84C-944B-1C568222F063}" type="datetime1">
               <a:rPr lang="en-US" smtClean="0"/>
-              <a:t>10/1/18</a:t>
+              <a:t>10/8/18</a:t>
             </a:fld>
             <a:endParaRPr lang="en-US"/>
           </a:p>
@@ -5304,7 +5304,7 @@
           <a:p>
             <a:fld id="{CCA7FE3F-9686-E74E-A1C5-774AE4FD679D}" type="datetime1">
               <a:rPr lang="en-US" smtClean="0"/>
-              <a:t>10/1/18</a:t>
+              <a:t>10/8/18</a:t>
             </a:fld>
             <a:endParaRPr lang="en-US"/>
           </a:p>
@@ -5638,7 +5638,7 @@
           <a:p>
             <a:fld id="{2C7281AE-07D0-B247-929E-89BE96173440}" type="datetime1">
               <a:rPr lang="en-US" smtClean="0"/>
-              <a:t>10/1/18</a:t>
+              <a:t>10/8/18</a:t>
             </a:fld>
             <a:endParaRPr lang="en-US"/>
           </a:p>
@@ -5918,7 +5918,7 @@
           <a:p>
             <a:fld id="{C6705A40-A93A-F546-99E4-15E941AFDCDE}" type="datetime1">
               <a:rPr lang="en-US" smtClean="0"/>
-              <a:t>10/1/18</a:t>
+              <a:t>10/8/18</a:t>
             </a:fld>
             <a:endParaRPr lang="en-US"/>
           </a:p>
@@ -6124,7 +6124,7 @@
           <a:p>
             <a:fld id="{8F4E8B77-2546-E24A-8CE5-D6A6150A518D}" type="datetime1">
               <a:rPr lang="en-US" smtClean="0"/>
-              <a:t>10/1/18</a:t>
+              <a:t>10/8/18</a:t>
             </a:fld>
             <a:endParaRPr lang="en-US"/>
           </a:p>
@@ -6338,7 +6338,7 @@
           <a:p>
             <a:fld id="{05923396-6093-FA48-B85F-62CA2E626F30}" type="datetime1">
               <a:rPr lang="en-US" smtClean="0"/>
-              <a:t>10/1/18</a:t>
+              <a:t>10/8/18</a:t>
             </a:fld>
             <a:endParaRPr lang="en-US"/>
           </a:p>
@@ -6571,7 +6571,7 @@
           <a:p>
             <a:fld id="{90F1244E-41D8-AA42-8B9B-7EE03FFE790D}" type="datetime1">
               <a:rPr lang="en-US" smtClean="0"/>
-              <a:t>10/1/18</a:t>
+              <a:t>10/8/18</a:t>
             </a:fld>
             <a:endParaRPr lang="en-US"/>
           </a:p>
@@ -6671,7 +6671,7 @@
           <p:cNvPr id="2" name="Title 1">
             <a:extLst>
               <a:ext uri="{FF2B5EF4-FFF2-40B4-BE49-F238E27FC236}">
-                <a16:creationId xmlns:a16="http://schemas.microsoft.com/office/drawing/2014/main" id="{FFC029B8-0887-0E44-94F7-FF3426F445C0}"/>
+                <a16:creationId xmlns:a16="http://schemas.microsoft.com/office/drawing/2014/main" id="{37A76CAF-80DC-C840-9F1B-4A3CD3151C0E}"/>
               </a:ext>
             </a:extLst>
           </p:cNvPr>
@@ -6689,7 +6689,7 @@
           <a:p>
             <a:r>
               <a:rPr lang="en-US" dirty="0"/>
-              <a:t>Introduction (Improving)</a:t>
+              <a:t>About Root Insurance</a:t>
             </a:r>
           </a:p>
         </p:txBody>
@@ -6699,7 +6699,7 @@
           <p:cNvPr id="3" name="Content Placeholder 2">
             <a:extLst>
               <a:ext uri="{FF2B5EF4-FFF2-40B4-BE49-F238E27FC236}">
-                <a16:creationId xmlns:a16="http://schemas.microsoft.com/office/drawing/2014/main" id="{70E434A7-7358-3F4D-B766-3F6626014219}"/>
+                <a16:creationId xmlns:a16="http://schemas.microsoft.com/office/drawing/2014/main" id="{30EC8718-0108-064F-B4C6-0F02BEB60B2B}"/>
               </a:ext>
             </a:extLst>
           </p:cNvPr>
@@ -6712,96 +6712,59 @@
         </p:nvSpPr>
         <p:spPr/>
         <p:txBody>
-          <a:bodyPr>
-            <a:normAutofit/>
-          </a:bodyPr>
-          <a:lstStyle/>
-          <a:p>
-            <a:r>
-              <a:rPr lang="en-US" sz="2000" b="1" dirty="0"/>
-              <a:t>Values: Excellence, Involvement, and Dedication</a:t>
-            </a:r>
-            <a:r>
-              <a:rPr lang="en-US" sz="2000" dirty="0"/>
-              <a:t> </a:t>
-            </a:r>
-          </a:p>
-          <a:p>
-            <a:r>
-              <a:rPr lang="en-US" sz="2000" dirty="0"/>
-              <a:t>Complete IT services firm, offering training, consulting, recruiting, and project services</a:t>
-            </a:r>
-          </a:p>
-          <a:p>
-            <a:r>
-              <a:rPr lang="en-US" sz="2000" dirty="0"/>
-              <a:t>Offices in Columbus, Cleveland, Calgary, Minneapolis, Dallas, Houston and College Station</a:t>
-            </a:r>
-          </a:p>
-          <a:p>
-            <a:r>
-              <a:rPr lang="en-US" sz="2000" dirty="0"/>
-              <a:t>Creating a great place to work by </a:t>
+          <a:bodyPr/>
+          <a:lstStyle/>
+          <a:p>
+            <a:r>
+              <a:rPr lang="en-US" dirty="0"/>
+              <a:t>Root is a car insurance carrier, like GEICO and Progressive</a:t>
+            </a:r>
+          </a:p>
+          <a:p>
+            <a:r>
+              <a:rPr lang="en-US" dirty="0"/>
+              <a:t>Root was started in 2015</a:t>
+            </a:r>
+          </a:p>
+          <a:p>
+            <a:r>
+              <a:rPr lang="en-US" dirty="0"/>
+              <a:t>We use data science and technology to identify and insure good drivers, reducing insurance premiums for good drivers as a result</a:t>
             </a:r>
           </a:p>
           <a:p>
             <a:pPr lvl="1"/>
             <a:r>
-              <a:rPr lang="en-US" sz="1800" dirty="0"/>
-              <a:t>Cultivating an environment that fosters authentic and long term professional relationships </a:t>
-            </a:r>
-          </a:p>
-          <a:p>
-            <a:pPr lvl="1"/>
-            <a:r>
-              <a:rPr lang="en-US" sz="1800" dirty="0"/>
-              <a:t>Sharing the success and accomplishments of the company </a:t>
-            </a:r>
-          </a:p>
-          <a:p>
-            <a:pPr lvl="1"/>
-            <a:r>
-              <a:rPr lang="en-US" sz="1800" dirty="0"/>
-              <a:t>Promoting open and honest communication </a:t>
-            </a:r>
-          </a:p>
-          <a:p>
-            <a:pPr lvl="1"/>
-            <a:r>
-              <a:rPr lang="en-US" sz="1800" dirty="0"/>
-              <a:t>Providing creative ways for each of us to learn and grow</a:t>
-            </a:r>
-          </a:p>
-          <a:p>
-            <a:pPr lvl="1"/>
-            <a:r>
-              <a:rPr lang="en-US" sz="1800" dirty="0"/>
-              <a:t>Encouraging a positive atmosphere which is both friendly and fun</a:t>
-            </a:r>
-          </a:p>
-          <a:p>
-            <a:r>
-              <a:rPr lang="en-US" sz="1950" dirty="0">
+              <a:rPr lang="en-US" dirty="0"/>
+              <a:t>Good drivers save up to $100/month.</a:t>
+            </a:r>
+          </a:p>
+          <a:p>
+            <a:r>
+              <a:rPr lang="en-US" dirty="0">
                 <a:hlinkClick r:id="rId2"/>
               </a:rPr>
-              <a:t>http://improving.com</a:t>
-            </a:r>
-            <a:endParaRPr lang="en-US" sz="1950" dirty="0"/>
-          </a:p>
-          <a:p>
-            <a:pPr marL="51435" indent="0">
-              <a:buNone/>
-            </a:pPr>
-            <a:endParaRPr lang="en-US" sz="1950" dirty="0"/>
-          </a:p>
-        </p:txBody>
-      </p:sp>
-      <p:sp>
-        <p:nvSpPr>
-          <p:cNvPr id="8" name="Date Placeholder 7">
-            <a:extLst>
-              <a:ext uri="{FF2B5EF4-FFF2-40B4-BE49-F238E27FC236}">
-                <a16:creationId xmlns:a16="http://schemas.microsoft.com/office/drawing/2014/main" id="{6E837635-BE8E-DC42-9AAD-543144F47EC4}"/>
+              <a:t>https://www.joinroot.com</a:t>
+            </a:r>
+            <a:endParaRPr lang="en-US" dirty="0"/>
+          </a:p>
+          <a:p>
+            <a:r>
+              <a:rPr lang="en-US" dirty="0">
+                <a:hlinkClick r:id="rId3"/>
+              </a:rPr>
+              <a:t>https://root.engineering</a:t>
+            </a:r>
+            <a:endParaRPr lang="en-US" dirty="0"/>
+          </a:p>
+        </p:txBody>
+      </p:sp>
+      <p:sp>
+        <p:nvSpPr>
+          <p:cNvPr id="4" name="Date Placeholder 3">
+            <a:extLst>
+              <a:ext uri="{FF2B5EF4-FFF2-40B4-BE49-F238E27FC236}">
+                <a16:creationId xmlns:a16="http://schemas.microsoft.com/office/drawing/2014/main" id="{21008EB9-5FFD-6C47-B8A4-017A107DDB5C}"/>
               </a:ext>
             </a:extLst>
           </p:cNvPr>
@@ -6817,9 +6780,9 @@
           <a:bodyPr/>
           <a:lstStyle/>
           <a:p>
-            <a:fld id="{70B2BE3B-434A-4A43-BB3B-1EA5BEE9C30E}" type="datetime1">
+            <a:fld id="{4BE75957-40B6-744E-99B6-AB95327FBD2E}" type="datetime1">
               <a:rPr lang="en-US" smtClean="0"/>
-              <a:t>10/1/18</a:t>
+              <a:t>10/8/18</a:t>
             </a:fld>
             <a:endParaRPr lang="en-US"/>
           </a:p>
@@ -6827,10 +6790,10 @@
       </p:sp>
       <p:sp>
         <p:nvSpPr>
-          <p:cNvPr id="9" name="Footer Placeholder 8">
-            <a:extLst>
-              <a:ext uri="{FF2B5EF4-FFF2-40B4-BE49-F238E27FC236}">
-                <a16:creationId xmlns:a16="http://schemas.microsoft.com/office/drawing/2014/main" id="{B3735C77-F02D-2B42-888A-7AFF083562A5}"/>
+          <p:cNvPr id="5" name="Footer Placeholder 4">
+            <a:extLst>
+              <a:ext uri="{FF2B5EF4-FFF2-40B4-BE49-F238E27FC236}">
+                <a16:creationId xmlns:a16="http://schemas.microsoft.com/office/drawing/2014/main" id="{51B27459-EBE3-B742-A4C9-257FAA18EFA7}"/>
               </a:ext>
             </a:extLst>
           </p:cNvPr>
@@ -6856,10 +6819,10 @@
       </p:sp>
       <p:sp>
         <p:nvSpPr>
-          <p:cNvPr id="10" name="Slide Number Placeholder 9">
-            <a:extLst>
-              <a:ext uri="{FF2B5EF4-FFF2-40B4-BE49-F238E27FC236}">
-                <a16:creationId xmlns:a16="http://schemas.microsoft.com/office/drawing/2014/main" id="{EC0E2B3D-519A-6246-BE1F-03C0D8E65832}"/>
+          <p:cNvPr id="6" name="Slide Number Placeholder 5">
+            <a:extLst>
+              <a:ext uri="{FF2B5EF4-FFF2-40B4-BE49-F238E27FC236}">
+                <a16:creationId xmlns:a16="http://schemas.microsoft.com/office/drawing/2014/main" id="{4C57BF17-F039-6B4D-94DC-B6E5490B8EAD}"/>
               </a:ext>
             </a:extLst>
           </p:cNvPr>
@@ -6887,7 +6850,7 @@
     </p:spTree>
     <p:extLst>
       <p:ext uri="{BB962C8B-B14F-4D97-AF65-F5344CB8AC3E}">
-        <p14:creationId xmlns:p14="http://schemas.microsoft.com/office/powerpoint/2010/main" val="2676875404"/>
+        <p14:creationId xmlns:p14="http://schemas.microsoft.com/office/powerpoint/2010/main" val="3933599127"/>
       </p:ext>
     </p:extLst>
   </p:cSld>
@@ -6961,7 +6924,7 @@
         <p:spPr/>
         <p:txBody>
           <a:bodyPr>
-            <a:normAutofit fontScale="92500" lnSpcReduction="20000"/>
+            <a:normAutofit fontScale="85000" lnSpcReduction="20000"/>
           </a:bodyPr>
           <a:lstStyle/>
           <a:p>
@@ -7055,7 +7018,14 @@
             <a:pPr lvl="2"/>
             <a:r>
               <a:rPr lang="en-US" dirty="0"/>
-              <a:t>C# with .NET Core 1.0 or 2.0</a:t>
+              <a:t>C# with .NET Core 1.0 or 2.0, C# and PowerShell with .NET Core 2.1</a:t>
+            </a:r>
+          </a:p>
+          <a:p>
+            <a:pPr lvl="2"/>
+            <a:r>
+              <a:rPr lang="en-US" dirty="0"/>
+              <a:t>Go 1.x</a:t>
             </a:r>
           </a:p>
           <a:p>
@@ -7069,7 +7039,7 @@
             <a:pPr lvl="2"/>
             <a:r>
               <a:rPr lang="en-US" dirty="0"/>
-              <a:t>NodeJS 6.10 or 8.10</a:t>
+              <a:t>NodeJS 4.3, 6.10 or 8.10</a:t>
             </a:r>
           </a:p>
           <a:p>
@@ -7108,7 +7078,7 @@
           <a:p>
             <a:fld id="{93D0FE6E-FA00-124B-A222-C2299CA2B7B2}" type="datetime1">
               <a:rPr lang="en-US" smtClean="0"/>
-              <a:t>10/1/18</a:t>
+              <a:t>10/8/18</a:t>
             </a:fld>
             <a:endParaRPr lang="en-US"/>
           </a:p>
@@ -7408,7 +7378,7 @@
           <a:p>
             <a:fld id="{2FC4B022-2D37-A442-BF0D-962CFBDC1E4F}" type="datetime1">
               <a:rPr lang="en-US" smtClean="0"/>
-              <a:t>10/1/18</a:t>
+              <a:t>10/8/18</a:t>
             </a:fld>
             <a:endParaRPr lang="en-US"/>
           </a:p>
@@ -7672,7 +7642,7 @@
           <a:p>
             <a:fld id="{4D9900D3-85F8-9C41-B3C3-A18873D7AF03}" type="datetime1">
               <a:rPr lang="en-US" smtClean="0"/>
-              <a:t>10/1/18</a:t>
+              <a:t>10/8/18</a:t>
             </a:fld>
             <a:endParaRPr lang="en-US"/>
           </a:p>
@@ -7997,7 +7967,7 @@
           <a:p>
             <a:fld id="{B455ACDA-5709-E44F-B381-D5CB3CB1E13A}" type="datetime1">
               <a:rPr lang="en-US" smtClean="0"/>
-              <a:t>10/1/18</a:t>
+              <a:t>10/8/18</a:t>
             </a:fld>
             <a:endParaRPr lang="en-US"/>
           </a:p>

</xml_diff>